<commit_message>
Ultimo commit antes de apresentar
</commit_message>
<xml_diff>
--- a/Documentacao/Apresentação TG - QuizFATEC.pptx
+++ b/Documentacao/Apresentação TG - QuizFATEC.pptx
@@ -10,13 +10,13 @@
     <p:sldId id="275" r:id="rId4"/>
     <p:sldId id="258" r:id="rId5"/>
     <p:sldId id="260" r:id="rId6"/>
-    <p:sldId id="259" r:id="rId7"/>
-    <p:sldId id="274" r:id="rId8"/>
+    <p:sldId id="274" r:id="rId7"/>
+    <p:sldId id="259" r:id="rId8"/>
     <p:sldId id="261" r:id="rId9"/>
     <p:sldId id="263" r:id="rId10"/>
-    <p:sldId id="264" r:id="rId11"/>
-    <p:sldId id="265" r:id="rId12"/>
-    <p:sldId id="266" r:id="rId13"/>
+    <p:sldId id="265" r:id="rId11"/>
+    <p:sldId id="266" r:id="rId12"/>
+    <p:sldId id="264" r:id="rId13"/>
     <p:sldId id="273" r:id="rId14"/>
     <p:sldId id="268" r:id="rId15"/>
     <p:sldId id="267" r:id="rId16"/>
@@ -128,6 +128,11 @@
       </a:defRPr>
     </a:lvl9pPr>
   </p:defaultTextStyle>
+  <p:extLst>
+    <p:ext uri="{EFAFB233-063F-42B5-8137-9DF3F51BA10A}">
+      <p15:sldGuideLst xmlns:p15="http://schemas.microsoft.com/office/powerpoint/2012/main"/>
+    </p:ext>
+  </p:extLst>
 </p:presentation>
 </file>
 
@@ -180,6 +185,11 @@
               </a:ln>
               <a:effectLst/>
             </c:spPr>
+            <c:extLst>
+              <c:ext xmlns:c16="http://schemas.microsoft.com/office/drawing/2014/chart" uri="{C3380CC4-5D6E-409C-BE32-E72D297353CC}">
+                <c16:uniqueId val="{00000001-1AF7-47DF-BABB-EF4CF4D9CB01}"/>
+              </c:ext>
+            </c:extLst>
           </c:dPt>
           <c:dPt>
             <c:idx val="1"/>
@@ -197,6 +207,11 @@
               </a:ln>
               <a:effectLst/>
             </c:spPr>
+            <c:extLst>
+              <c:ext xmlns:c16="http://schemas.microsoft.com/office/drawing/2014/chart" uri="{C3380CC4-5D6E-409C-BE32-E72D297353CC}">
+                <c16:uniqueId val="{00000003-1AF7-47DF-BABB-EF4CF4D9CB01}"/>
+              </c:ext>
+            </c:extLst>
           </c:dPt>
           <c:dPt>
             <c:idx val="2"/>
@@ -214,6 +229,11 @@
               </a:ln>
               <a:effectLst/>
             </c:spPr>
+            <c:extLst>
+              <c:ext xmlns:c16="http://schemas.microsoft.com/office/drawing/2014/chart" uri="{C3380CC4-5D6E-409C-BE32-E72D297353CC}">
+                <c16:uniqueId val="{00000005-1AF7-47DF-BABB-EF4CF4D9CB01}"/>
+              </c:ext>
+            </c:extLst>
           </c:dPt>
           <c:dPt>
             <c:idx val="3"/>
@@ -231,6 +251,11 @@
               </a:ln>
               <a:effectLst/>
             </c:spPr>
+            <c:extLst>
+              <c:ext xmlns:c16="http://schemas.microsoft.com/office/drawing/2014/chart" uri="{C3380CC4-5D6E-409C-BE32-E72D297353CC}">
+                <c16:uniqueId val="{00000007-1AF7-47DF-BABB-EF4CF4D9CB01}"/>
+              </c:ext>
+            </c:extLst>
           </c:dPt>
           <c:dLbls>
             <c:spPr>
@@ -1092,7 +1117,7 @@
           <a:p>
             <a:fld id="{391BA8BA-4A05-469E-8C42-FC9DD0572308}" type="datetimeFigureOut">
               <a:rPr lang="pt-BR" smtClean="0"/>
-              <a:t>02/02/2020</a:t>
+              <a:t>11/02/2020</a:t>
             </a:fld>
             <a:endParaRPr lang="pt-BR"/>
           </a:p>
@@ -1290,7 +1315,7 @@
           <a:p>
             <a:fld id="{391BA8BA-4A05-469E-8C42-FC9DD0572308}" type="datetimeFigureOut">
               <a:rPr lang="pt-BR" smtClean="0"/>
-              <a:t>02/02/2020</a:t>
+              <a:t>11/02/2020</a:t>
             </a:fld>
             <a:endParaRPr lang="pt-BR"/>
           </a:p>
@@ -1498,7 +1523,7 @@
           <a:p>
             <a:fld id="{391BA8BA-4A05-469E-8C42-FC9DD0572308}" type="datetimeFigureOut">
               <a:rPr lang="pt-BR" smtClean="0"/>
-              <a:t>02/02/2020</a:t>
+              <a:t>11/02/2020</a:t>
             </a:fld>
             <a:endParaRPr lang="pt-BR"/>
           </a:p>
@@ -1696,7 +1721,7 @@
           <a:p>
             <a:fld id="{391BA8BA-4A05-469E-8C42-FC9DD0572308}" type="datetimeFigureOut">
               <a:rPr lang="pt-BR" smtClean="0"/>
-              <a:t>02/02/2020</a:t>
+              <a:t>11/02/2020</a:t>
             </a:fld>
             <a:endParaRPr lang="pt-BR"/>
           </a:p>
@@ -1971,7 +1996,7 @@
           <a:p>
             <a:fld id="{391BA8BA-4A05-469E-8C42-FC9DD0572308}" type="datetimeFigureOut">
               <a:rPr lang="pt-BR" smtClean="0"/>
-              <a:t>02/02/2020</a:t>
+              <a:t>11/02/2020</a:t>
             </a:fld>
             <a:endParaRPr lang="pt-BR"/>
           </a:p>
@@ -2236,7 +2261,7 @@
           <a:p>
             <a:fld id="{391BA8BA-4A05-469E-8C42-FC9DD0572308}" type="datetimeFigureOut">
               <a:rPr lang="pt-BR" smtClean="0"/>
-              <a:t>02/02/2020</a:t>
+              <a:t>11/02/2020</a:t>
             </a:fld>
             <a:endParaRPr lang="pt-BR"/>
           </a:p>
@@ -2648,7 +2673,7 @@
           <a:p>
             <a:fld id="{391BA8BA-4A05-469E-8C42-FC9DD0572308}" type="datetimeFigureOut">
               <a:rPr lang="pt-BR" smtClean="0"/>
-              <a:t>02/02/2020</a:t>
+              <a:t>11/02/2020</a:t>
             </a:fld>
             <a:endParaRPr lang="pt-BR"/>
           </a:p>
@@ -2789,7 +2814,7 @@
           <a:p>
             <a:fld id="{391BA8BA-4A05-469E-8C42-FC9DD0572308}" type="datetimeFigureOut">
               <a:rPr lang="pt-BR" smtClean="0"/>
-              <a:t>02/02/2020</a:t>
+              <a:t>11/02/2020</a:t>
             </a:fld>
             <a:endParaRPr lang="pt-BR"/>
           </a:p>
@@ -2902,7 +2927,7 @@
           <a:p>
             <a:fld id="{391BA8BA-4A05-469E-8C42-FC9DD0572308}" type="datetimeFigureOut">
               <a:rPr lang="pt-BR" smtClean="0"/>
-              <a:t>02/02/2020</a:t>
+              <a:t>11/02/2020</a:t>
             </a:fld>
             <a:endParaRPr lang="pt-BR"/>
           </a:p>
@@ -3213,7 +3238,7 @@
           <a:p>
             <a:fld id="{391BA8BA-4A05-469E-8C42-FC9DD0572308}" type="datetimeFigureOut">
               <a:rPr lang="pt-BR" smtClean="0"/>
-              <a:t>02/02/2020</a:t>
+              <a:t>11/02/2020</a:t>
             </a:fld>
             <a:endParaRPr lang="pt-BR"/>
           </a:p>
@@ -3501,7 +3526,7 @@
           <a:p>
             <a:fld id="{391BA8BA-4A05-469E-8C42-FC9DD0572308}" type="datetimeFigureOut">
               <a:rPr lang="pt-BR" smtClean="0"/>
-              <a:t>02/02/2020</a:t>
+              <a:t>11/02/2020</a:t>
             </a:fld>
             <a:endParaRPr lang="pt-BR"/>
           </a:p>
@@ -3742,7 +3767,7 @@
           <a:p>
             <a:fld id="{391BA8BA-4A05-469E-8C42-FC9DD0572308}" type="datetimeFigureOut">
               <a:rPr lang="pt-BR" smtClean="0"/>
-              <a:t>02/02/2020</a:t>
+              <a:t>11/02/2020</a:t>
             </a:fld>
             <a:endParaRPr lang="pt-BR"/>
           </a:p>
@@ -4183,16 +4208,16 @@
         </p:spPr>
         <p:txBody>
           <a:bodyPr>
-            <a:normAutofit/>
+            <a:normAutofit fontScale="90000"/>
           </a:bodyPr>
           <a:lstStyle/>
           <a:p>
             <a:r>
-              <a:rPr lang="pt-BR" sz="5300" b="1" dirty="0">
-                <a:latin typeface="Times New Roman" panose="02020603050405020304" pitchFamily="18" charset="0"/>
-                <a:cs typeface="Times New Roman" panose="02020603050405020304" pitchFamily="18" charset="0"/>
-              </a:rPr>
-              <a:t>QuizFATEC: Banco de Questões e Aplicativo Móvel Simulador dos Vestibulares da FATEC</a:t>
+              <a:rPr lang="pt-BR" b="1" dirty="0">
+                <a:latin typeface="Times New Roman" panose="02020603050405020304" pitchFamily="18" charset="0"/>
+                <a:cs typeface="Times New Roman" panose="02020603050405020304" pitchFamily="18" charset="0"/>
+              </a:rPr>
+              <a:t>Aplicação de ETL e Raspagem de Dados para Compor Um Banco de Questões</a:t>
             </a:r>
             <a:br>
               <a:rPr lang="pt-BR" dirty="0"/>
@@ -4230,25 +4255,37 @@
           <a:lstStyle/>
           <a:p>
             <a:r>
-              <a:rPr lang="pt-BR" sz="2200" dirty="0"/>
+              <a:rPr lang="pt-BR" sz="2200" dirty="0">
+                <a:latin typeface="Times New Roman" panose="02020603050405020304" pitchFamily="18" charset="0"/>
+                <a:cs typeface="Times New Roman" panose="02020603050405020304" pitchFamily="18" charset="0"/>
+              </a:rPr>
               <a:t>NOME(S) DO(S) AUTOR(ES): Cesar Augusto Siqueira Santos </a:t>
             </a:r>
           </a:p>
           <a:p>
             <a:r>
-              <a:rPr lang="pt-BR" sz="2200" dirty="0"/>
+              <a:rPr lang="pt-BR" sz="2200" dirty="0">
+                <a:latin typeface="Times New Roman" panose="02020603050405020304" pitchFamily="18" charset="0"/>
+                <a:cs typeface="Times New Roman" panose="02020603050405020304" pitchFamily="18" charset="0"/>
+              </a:rPr>
               <a:t>TÍTULO DO TRABALHO: QuizFATEC: Banco de Questões e Aplicativo Móvel Simulador dos Vestibulares da FATEC</a:t>
             </a:r>
           </a:p>
           <a:p>
             <a:r>
-              <a:rPr lang="pt-BR" sz="2200" dirty="0"/>
+              <a:rPr lang="pt-BR" sz="2200" dirty="0">
+                <a:latin typeface="Times New Roman" panose="02020603050405020304" pitchFamily="18" charset="0"/>
+                <a:cs typeface="Times New Roman" panose="02020603050405020304" pitchFamily="18" charset="0"/>
+              </a:rPr>
               <a:t>TIPO DO TRABALHO/ANO: Trabalho de Graduação/2019.</a:t>
             </a:r>
           </a:p>
           <a:p>
             <a:r>
-              <a:rPr lang="pt-BR" dirty="0"/>
+              <a:rPr lang="pt-BR" dirty="0">
+                <a:latin typeface="Times New Roman" panose="02020603050405020304" pitchFamily="18" charset="0"/>
+                <a:cs typeface="Times New Roman" panose="02020603050405020304" pitchFamily="18" charset="0"/>
+              </a:rPr>
               <a:t> </a:t>
             </a:r>
           </a:p>
@@ -4292,157 +4329,6 @@
           <p:cNvPr id="2" name="Título 1">
             <a:extLst>
               <a:ext uri="{FF2B5EF4-FFF2-40B4-BE49-F238E27FC236}">
-                <a16:creationId xmlns:a16="http://schemas.microsoft.com/office/drawing/2014/main" id="{2215193C-093C-44A5-A5A7-611AB688EB25}"/>
-              </a:ext>
-            </a:extLst>
-          </p:cNvPr>
-          <p:cNvSpPr>
-            <a:spLocks noGrp="1"/>
-          </p:cNvSpPr>
-          <p:nvPr>
-            <p:ph type="title"/>
-          </p:nvPr>
-        </p:nvSpPr>
-        <p:spPr>
-          <a:xfrm>
-            <a:off x="720704" y="0"/>
-            <a:ext cx="10750591" cy="1324800"/>
-          </a:xfrm>
-        </p:spPr>
-        <p:txBody>
-          <a:bodyPr>
-            <a:normAutofit/>
-          </a:bodyPr>
-          <a:lstStyle/>
-          <a:p>
-            <a:r>
-              <a:rPr lang="pt-BR" dirty="0">
-                <a:latin typeface="Times New Roman" panose="02020603050405020304" pitchFamily="18" charset="0"/>
-                <a:cs typeface="Times New Roman" panose="02020603050405020304" pitchFamily="18" charset="0"/>
-              </a:rPr>
-              <a:t>2.4. Tecnologias Semelhantes</a:t>
-            </a:r>
-          </a:p>
-        </p:txBody>
-      </p:sp>
-      <p:sp>
-        <p:nvSpPr>
-          <p:cNvPr id="3" name="Espaço Reservado para Conteúdo 2">
-            <a:extLst>
-              <a:ext uri="{FF2B5EF4-FFF2-40B4-BE49-F238E27FC236}">
-                <a16:creationId xmlns:a16="http://schemas.microsoft.com/office/drawing/2014/main" id="{E9779A88-64BF-47E9-A5F4-6A5F0DC07C61}"/>
-              </a:ext>
-            </a:extLst>
-          </p:cNvPr>
-          <p:cNvSpPr>
-            <a:spLocks noGrp="1"/>
-          </p:cNvSpPr>
-          <p:nvPr>
-            <p:ph idx="1"/>
-          </p:nvPr>
-        </p:nvSpPr>
-        <p:spPr>
-          <a:xfrm>
-            <a:off x="608290" y="1536290"/>
-            <a:ext cx="11126510" cy="5179469"/>
-          </a:xfrm>
-        </p:spPr>
-        <p:txBody>
-          <a:bodyPr>
-            <a:normAutofit/>
-          </a:bodyPr>
-          <a:lstStyle/>
-          <a:p>
-            <a:r>
-              <a:rPr lang="pt-BR" b="1" dirty="0">
-                <a:latin typeface="Times New Roman" panose="02020603050405020304" pitchFamily="18" charset="0"/>
-                <a:cs typeface="Times New Roman" panose="02020603050405020304" pitchFamily="18" charset="0"/>
-              </a:rPr>
-              <a:t>Super Professor – Banco de Questões</a:t>
-            </a:r>
-          </a:p>
-          <a:p>
-            <a:endParaRPr lang="pt-BR" b="1" dirty="0">
-              <a:latin typeface="Times New Roman" panose="02020603050405020304" pitchFamily="18" charset="0"/>
-              <a:cs typeface="Times New Roman" panose="02020603050405020304" pitchFamily="18" charset="0"/>
-            </a:endParaRPr>
-          </a:p>
-          <a:p>
-            <a:r>
-              <a:rPr lang="pt-BR" b="1" dirty="0">
-                <a:latin typeface="Times New Roman" panose="02020603050405020304" pitchFamily="18" charset="0"/>
-                <a:cs typeface="Times New Roman" panose="02020603050405020304" pitchFamily="18" charset="0"/>
-              </a:rPr>
-              <a:t>Só Exercícios -Banco de Questões</a:t>
-            </a:r>
-          </a:p>
-          <a:p>
-            <a:endParaRPr lang="pt-BR" b="1" dirty="0">
-              <a:latin typeface="Times New Roman" panose="02020603050405020304" pitchFamily="18" charset="0"/>
-              <a:cs typeface="Times New Roman" panose="02020603050405020304" pitchFamily="18" charset="0"/>
-            </a:endParaRPr>
-          </a:p>
-          <a:p>
-            <a:r>
-              <a:rPr lang="pt-BR" b="1" dirty="0">
-                <a:latin typeface="Times New Roman" panose="02020603050405020304" pitchFamily="18" charset="0"/>
-                <a:cs typeface="Times New Roman" panose="02020603050405020304" pitchFamily="18" charset="0"/>
-              </a:rPr>
-              <a:t>Aplicativo Perguntados 1 e 2</a:t>
-            </a:r>
-          </a:p>
-          <a:p>
-            <a:endParaRPr lang="pt-BR" b="1" dirty="0">
-              <a:latin typeface="Times New Roman" panose="02020603050405020304" pitchFamily="18" charset="0"/>
-              <a:cs typeface="Times New Roman" panose="02020603050405020304" pitchFamily="18" charset="0"/>
-            </a:endParaRPr>
-          </a:p>
-          <a:p>
-            <a:r>
-              <a:rPr lang="pt-BR" b="1" dirty="0">
-                <a:latin typeface="Times New Roman" panose="02020603050405020304" pitchFamily="18" charset="0"/>
-                <a:cs typeface="Times New Roman" panose="02020603050405020304" pitchFamily="18" charset="0"/>
-              </a:rPr>
-              <a:t>Simulado Detran-SP</a:t>
-            </a:r>
-          </a:p>
-        </p:txBody>
-      </p:sp>
-    </p:spTree>
-    <p:extLst>
-      <p:ext uri="{BB962C8B-B14F-4D97-AF65-F5344CB8AC3E}">
-        <p14:creationId xmlns:p14="http://schemas.microsoft.com/office/powerpoint/2010/main" val="15640257"/>
-      </p:ext>
-    </p:extLst>
-  </p:cSld>
-  <p:clrMapOvr>
-    <a:masterClrMapping/>
-  </p:clrMapOvr>
-</p:sld>
-</file>
-
-<file path=ppt/slides/slide11.xml><?xml version="1.0" encoding="utf-8"?>
-<p:sld xmlns:a="http://schemas.openxmlformats.org/drawingml/2006/main" xmlns:r="http://schemas.openxmlformats.org/officeDocument/2006/relationships" xmlns:p="http://schemas.openxmlformats.org/presentationml/2006/main">
-  <p:cSld>
-    <p:spTree>
-      <p:nvGrpSpPr>
-        <p:cNvPr id="1" name=""/>
-        <p:cNvGrpSpPr/>
-        <p:nvPr/>
-      </p:nvGrpSpPr>
-      <p:grpSpPr>
-        <a:xfrm>
-          <a:off x="0" y="0"/>
-          <a:ext cx="0" cy="0"/>
-          <a:chOff x="0" y="0"/>
-          <a:chExt cx="0" cy="0"/>
-        </a:xfrm>
-      </p:grpSpPr>
-      <p:sp>
-        <p:nvSpPr>
-          <p:cNvPr id="2" name="Título 1">
-            <a:extLst>
-              <a:ext uri="{FF2B5EF4-FFF2-40B4-BE49-F238E27FC236}">
                 <a16:creationId xmlns:a16="http://schemas.microsoft.com/office/drawing/2014/main" id="{4D0911BC-2617-4DA6-9ADA-8842E8FD79BD}"/>
               </a:ext>
             </a:extLst>
@@ -4469,7 +4355,7 @@
                 <a:latin typeface="Times New Roman" panose="02020603050405020304" pitchFamily="18" charset="0"/>
                 <a:cs typeface="Times New Roman" panose="02020603050405020304" pitchFamily="18" charset="0"/>
               </a:rPr>
-              <a:t>2.5. Banco de Dado NoSQL</a:t>
+              <a:t>2.4. Banco de Dado NoSQL</a:t>
             </a:r>
           </a:p>
         </p:txBody>
@@ -4581,7 +4467,21 @@
                 <a:latin typeface="Times New Roman" panose="02020603050405020304" pitchFamily="18" charset="0"/>
                 <a:cs typeface="Times New Roman" panose="02020603050405020304" pitchFamily="18" charset="0"/>
               </a:rPr>
-              <a:t> flexível, pode ser utilizado de maneira ágil no desenvolvimento de data warehouse, por exemplo. </a:t>
+              <a:t> flexível, pode ser utilizado de maneira ágil no desenvolvimento de </a:t>
+            </a:r>
+            <a:r>
+              <a:rPr lang="pt-BR" i="1" dirty="0">
+                <a:latin typeface="Times New Roman" panose="02020603050405020304" pitchFamily="18" charset="0"/>
+                <a:cs typeface="Times New Roman" panose="02020603050405020304" pitchFamily="18" charset="0"/>
+              </a:rPr>
+              <a:t>data warehouse</a:t>
+            </a:r>
+            <a:r>
+              <a:rPr lang="pt-BR" dirty="0">
+                <a:latin typeface="Times New Roman" panose="02020603050405020304" pitchFamily="18" charset="0"/>
+                <a:cs typeface="Times New Roman" panose="02020603050405020304" pitchFamily="18" charset="0"/>
+              </a:rPr>
+              <a:t>, por exemplo. </a:t>
             </a:r>
           </a:p>
         </p:txBody>
@@ -4627,6 +4527,115 @@
 </p:sld>
 </file>
 
+<file path=ppt/slides/slide11.xml><?xml version="1.0" encoding="utf-8"?>
+<p:sld xmlns:a="http://schemas.openxmlformats.org/drawingml/2006/main" xmlns:r="http://schemas.openxmlformats.org/officeDocument/2006/relationships" xmlns:p="http://schemas.openxmlformats.org/presentationml/2006/main">
+  <p:cSld>
+    <p:spTree>
+      <p:nvGrpSpPr>
+        <p:cNvPr id="1" name=""/>
+        <p:cNvGrpSpPr/>
+        <p:nvPr/>
+      </p:nvGrpSpPr>
+      <p:grpSpPr>
+        <a:xfrm>
+          <a:off x="0" y="0"/>
+          <a:ext cx="0" cy="0"/>
+          <a:chOff x="0" y="0"/>
+          <a:chExt cx="0" cy="0"/>
+        </a:xfrm>
+      </p:grpSpPr>
+      <p:sp>
+        <p:nvSpPr>
+          <p:cNvPr id="2" name="Título 1">
+            <a:extLst>
+              <a:ext uri="{FF2B5EF4-FFF2-40B4-BE49-F238E27FC236}">
+                <a16:creationId xmlns:a16="http://schemas.microsoft.com/office/drawing/2014/main" id="{4D0911BC-2617-4DA6-9ADA-8842E8FD79BD}"/>
+              </a:ext>
+            </a:extLst>
+          </p:cNvPr>
+          <p:cNvSpPr>
+            <a:spLocks noGrp="1"/>
+          </p:cNvSpPr>
+          <p:nvPr>
+            <p:ph type="title"/>
+          </p:nvPr>
+        </p:nvSpPr>
+        <p:spPr>
+          <a:xfrm>
+            <a:off x="838200" y="0"/>
+            <a:ext cx="10515600" cy="1325563"/>
+          </a:xfrm>
+        </p:spPr>
+        <p:txBody>
+          <a:bodyPr/>
+          <a:lstStyle/>
+          <a:p>
+            <a:r>
+              <a:rPr lang="pt-BR" dirty="0">
+                <a:latin typeface="Times New Roman" panose="02020603050405020304" pitchFamily="18" charset="0"/>
+                <a:cs typeface="Times New Roman" panose="02020603050405020304" pitchFamily="18" charset="0"/>
+              </a:rPr>
+              <a:t>2.5. Ionic</a:t>
+            </a:r>
+          </a:p>
+        </p:txBody>
+      </p:sp>
+      <p:sp>
+        <p:nvSpPr>
+          <p:cNvPr id="3" name="Espaço Reservado para Conteúdo 2">
+            <a:extLst>
+              <a:ext uri="{FF2B5EF4-FFF2-40B4-BE49-F238E27FC236}">
+                <a16:creationId xmlns:a16="http://schemas.microsoft.com/office/drawing/2014/main" id="{F6CF8ADC-F85B-41A7-9467-568E6A85B4F5}"/>
+              </a:ext>
+            </a:extLst>
+          </p:cNvPr>
+          <p:cNvSpPr>
+            <a:spLocks noGrp="1"/>
+          </p:cNvSpPr>
+          <p:nvPr>
+            <p:ph idx="1"/>
+          </p:nvPr>
+        </p:nvSpPr>
+        <p:spPr/>
+        <p:txBody>
+          <a:bodyPr/>
+          <a:lstStyle/>
+          <a:p>
+            <a:r>
+              <a:rPr lang="pt-BR" dirty="0">
+                <a:latin typeface="Times New Roman" panose="02020603050405020304" pitchFamily="18" charset="0"/>
+                <a:cs typeface="Times New Roman" panose="02020603050405020304" pitchFamily="18" charset="0"/>
+              </a:rPr>
+              <a:t>Ionic Framework é um conjunto de ferramentas open source, criado com o objetivo de desenvolver aplicativos Web e para dispositivos móveis usando tecnologias Web, como HTML, JavaScript e CSS (IONIC, 2019).</a:t>
+            </a:r>
+          </a:p>
+          <a:p>
+            <a:r>
+              <a:rPr lang="pt-BR" dirty="0">
+                <a:latin typeface="Times New Roman" panose="02020603050405020304" pitchFamily="18" charset="0"/>
+                <a:cs typeface="Times New Roman" panose="02020603050405020304" pitchFamily="18" charset="0"/>
+              </a:rPr>
+              <a:t>  O Framework Ionic se mostra vantajoso, principalmente pela possibilidade de acesso nativo para Android e iOS através de uma única WebView, construída pelo conjunto de ferramentas do Ionic, os aplicativos desenvolvidos usando Ionic são suportados pelo Android, a partir da versão 4.4, e o iOS a partir da versão 10. </a:t>
+            </a:r>
+          </a:p>
+          <a:p>
+            <a:endParaRPr lang="pt-BR" dirty="0"/>
+          </a:p>
+        </p:txBody>
+      </p:sp>
+    </p:spTree>
+    <p:extLst>
+      <p:ext uri="{BB962C8B-B14F-4D97-AF65-F5344CB8AC3E}">
+        <p14:creationId xmlns:p14="http://schemas.microsoft.com/office/powerpoint/2010/main" val="2403127242"/>
+      </p:ext>
+    </p:extLst>
+  </p:cSld>
+  <p:clrMapOvr>
+    <a:masterClrMapping/>
+  </p:clrMapOvr>
+</p:sld>
+</file>
+
 <file path=ppt/slides/slide12.xml><?xml version="1.0" encoding="utf-8"?>
 <p:sld xmlns:a="http://schemas.openxmlformats.org/drawingml/2006/main" xmlns:r="http://schemas.openxmlformats.org/officeDocument/2006/relationships" xmlns:p="http://schemas.openxmlformats.org/presentationml/2006/main">
   <p:cSld>
@@ -4649,7 +4658,7 @@
           <p:cNvPr id="2" name="Título 1">
             <a:extLst>
               <a:ext uri="{FF2B5EF4-FFF2-40B4-BE49-F238E27FC236}">
-                <a16:creationId xmlns:a16="http://schemas.microsoft.com/office/drawing/2014/main" id="{4D0911BC-2617-4DA6-9ADA-8842E8FD79BD}"/>
+                <a16:creationId xmlns:a16="http://schemas.microsoft.com/office/drawing/2014/main" id="{2215193C-093C-44A5-A5A7-611AB688EB25}"/>
               </a:ext>
             </a:extLst>
           </p:cNvPr>
@@ -4662,12 +4671,14 @@
         </p:nvSpPr>
         <p:spPr>
           <a:xfrm>
-            <a:off x="838200" y="0"/>
-            <a:ext cx="10515600" cy="1325563"/>
+            <a:off x="720704" y="0"/>
+            <a:ext cx="10750591" cy="1324800"/>
           </a:xfrm>
         </p:spPr>
         <p:txBody>
-          <a:bodyPr/>
+          <a:bodyPr>
+            <a:normAutofit/>
+          </a:bodyPr>
           <a:lstStyle/>
           <a:p>
             <a:r>
@@ -4675,7 +4686,7 @@
                 <a:latin typeface="Times New Roman" panose="02020603050405020304" pitchFamily="18" charset="0"/>
                 <a:cs typeface="Times New Roman" panose="02020603050405020304" pitchFamily="18" charset="0"/>
               </a:rPr>
-              <a:t>2.6. Ionic</a:t>
+              <a:t>2.6. Tecnologias Semelhantes</a:t>
             </a:r>
           </a:p>
         </p:txBody>
@@ -4685,7 +4696,7 @@
           <p:cNvPr id="3" name="Espaço Reservado para Conteúdo 2">
             <a:extLst>
               <a:ext uri="{FF2B5EF4-FFF2-40B4-BE49-F238E27FC236}">
-                <a16:creationId xmlns:a16="http://schemas.microsoft.com/office/drawing/2014/main" id="{F6CF8ADC-F85B-41A7-9467-568E6A85B4F5}"/>
+                <a16:creationId xmlns:a16="http://schemas.microsoft.com/office/drawing/2014/main" id="{E9779A88-64BF-47E9-A5F4-6A5F0DC07C61}"/>
               </a:ext>
             </a:extLst>
           </p:cNvPr>
@@ -4696,37 +4707,77 @@
             <p:ph idx="1"/>
           </p:nvPr>
         </p:nvSpPr>
-        <p:spPr/>
-        <p:txBody>
-          <a:bodyPr/>
-          <a:lstStyle/>
-          <a:p>
-            <a:r>
-              <a:rPr lang="pt-BR" dirty="0">
-                <a:latin typeface="Times New Roman" panose="02020603050405020304" pitchFamily="18" charset="0"/>
-                <a:cs typeface="Times New Roman" panose="02020603050405020304" pitchFamily="18" charset="0"/>
-              </a:rPr>
-              <a:t>Ionic Framework é um conjunto de ferramentas open source, criado com o objetivo de desenvolver aplicativos Web e para dispositivos móveis usando tecnologias Web, como HTML, JavaScript e CSS (IONIC, 2019).</a:t>
-            </a:r>
-          </a:p>
-          <a:p>
-            <a:r>
-              <a:rPr lang="pt-BR" dirty="0">
-                <a:latin typeface="Times New Roman" panose="02020603050405020304" pitchFamily="18" charset="0"/>
-                <a:cs typeface="Times New Roman" panose="02020603050405020304" pitchFamily="18" charset="0"/>
-              </a:rPr>
-              <a:t>  O Framework Ionic se mostra vantajoso, principalmente pela possibilidade de acesso nativo para Android e iOS através de uma única WebView, construída pelo conjunto de ferramentas do Ionic, os aplicativos desenvolvidos usando Ionic são suportados pelo Android, a partir da versão 4.4, e o iOS a partir da versão 10. </a:t>
-            </a:r>
-          </a:p>
-          <a:p>
-            <a:endParaRPr lang="pt-BR" dirty="0"/>
+        <p:spPr>
+          <a:xfrm>
+            <a:off x="608290" y="1536290"/>
+            <a:ext cx="11126510" cy="5179469"/>
+          </a:xfrm>
+        </p:spPr>
+        <p:txBody>
+          <a:bodyPr>
+            <a:normAutofit/>
+          </a:bodyPr>
+          <a:lstStyle/>
+          <a:p>
+            <a:r>
+              <a:rPr lang="pt-BR" b="1" dirty="0">
+                <a:latin typeface="Times New Roman" panose="02020603050405020304" pitchFamily="18" charset="0"/>
+                <a:cs typeface="Times New Roman" panose="02020603050405020304" pitchFamily="18" charset="0"/>
+              </a:rPr>
+              <a:t>Super Professor – Banco de Questões</a:t>
+            </a:r>
+          </a:p>
+          <a:p>
+            <a:endParaRPr lang="pt-BR" b="1" dirty="0">
+              <a:latin typeface="Times New Roman" panose="02020603050405020304" pitchFamily="18" charset="0"/>
+              <a:cs typeface="Times New Roman" panose="02020603050405020304" pitchFamily="18" charset="0"/>
+            </a:endParaRPr>
+          </a:p>
+          <a:p>
+            <a:r>
+              <a:rPr lang="pt-BR" b="1" dirty="0">
+                <a:latin typeface="Times New Roman" panose="02020603050405020304" pitchFamily="18" charset="0"/>
+                <a:cs typeface="Times New Roman" panose="02020603050405020304" pitchFamily="18" charset="0"/>
+              </a:rPr>
+              <a:t>Só Exercícios – Banco de Questões</a:t>
+            </a:r>
+          </a:p>
+          <a:p>
+            <a:endParaRPr lang="pt-BR" b="1" dirty="0">
+              <a:latin typeface="Times New Roman" panose="02020603050405020304" pitchFamily="18" charset="0"/>
+              <a:cs typeface="Times New Roman" panose="02020603050405020304" pitchFamily="18" charset="0"/>
+            </a:endParaRPr>
+          </a:p>
+          <a:p>
+            <a:r>
+              <a:rPr lang="pt-BR" b="1" dirty="0">
+                <a:latin typeface="Times New Roman" panose="02020603050405020304" pitchFamily="18" charset="0"/>
+                <a:cs typeface="Times New Roman" panose="02020603050405020304" pitchFamily="18" charset="0"/>
+              </a:rPr>
+              <a:t>Aplicativo Perguntados 1 e 2</a:t>
+            </a:r>
+          </a:p>
+          <a:p>
+            <a:endParaRPr lang="pt-BR" b="1" dirty="0">
+              <a:latin typeface="Times New Roman" panose="02020603050405020304" pitchFamily="18" charset="0"/>
+              <a:cs typeface="Times New Roman" panose="02020603050405020304" pitchFamily="18" charset="0"/>
+            </a:endParaRPr>
+          </a:p>
+          <a:p>
+            <a:r>
+              <a:rPr lang="pt-BR" b="1" dirty="0">
+                <a:latin typeface="Times New Roman" panose="02020603050405020304" pitchFamily="18" charset="0"/>
+                <a:cs typeface="Times New Roman" panose="02020603050405020304" pitchFamily="18" charset="0"/>
+              </a:rPr>
+              <a:t>Simulado Detran-SP</a:t>
+            </a:r>
           </a:p>
         </p:txBody>
       </p:sp>
     </p:spTree>
     <p:extLst>
       <p:ext uri="{BB962C8B-B14F-4D97-AF65-F5344CB8AC3E}">
-        <p14:creationId xmlns:p14="http://schemas.microsoft.com/office/powerpoint/2010/main" val="2403127242"/>
+        <p14:creationId xmlns:p14="http://schemas.microsoft.com/office/powerpoint/2010/main" val="15640257"/>
       </p:ext>
     </p:extLst>
   </p:cSld>
@@ -6010,7 +6061,10 @@
           <a:lstStyle/>
           <a:p>
             <a:r>
-              <a:rPr lang="pt-BR" dirty="0"/>
+              <a:rPr lang="pt-BR" dirty="0">
+                <a:latin typeface="Times New Roman" panose="02020603050405020304" pitchFamily="18" charset="0"/>
+                <a:cs typeface="Times New Roman" panose="02020603050405020304" pitchFamily="18" charset="0"/>
+              </a:rPr>
               <a:t>Agenda</a:t>
             </a:r>
           </a:p>
@@ -6133,7 +6187,7 @@
                 <a:latin typeface="Times New Roman" panose="02020603050405020304" pitchFamily="18" charset="0"/>
                 <a:cs typeface="Times New Roman" panose="02020603050405020304" pitchFamily="18" charset="0"/>
               </a:rPr>
-              <a:t> 2.4.  Tecnologias Semelhantes</a:t>
+              <a:t> 2.4.  Banco de dados NoSQL</a:t>
             </a:r>
           </a:p>
           <a:p>
@@ -6145,7 +6199,7 @@
                 <a:latin typeface="Times New Roman" panose="02020603050405020304" pitchFamily="18" charset="0"/>
                 <a:cs typeface="Times New Roman" panose="02020603050405020304" pitchFamily="18" charset="0"/>
               </a:rPr>
-              <a:t> 2.5.  Banco de dados NoSQL</a:t>
+              <a:t> 2.5.  Ionic</a:t>
             </a:r>
           </a:p>
           <a:p>
@@ -6157,7 +6211,7 @@
                 <a:latin typeface="Times New Roman" panose="02020603050405020304" pitchFamily="18" charset="0"/>
                 <a:cs typeface="Times New Roman" panose="02020603050405020304" pitchFamily="18" charset="0"/>
               </a:rPr>
-              <a:t> 2.6.  Ionic</a:t>
+              <a:t> 2.6.  Tecnologias Semelhantes</a:t>
             </a:r>
           </a:p>
           <a:p>
@@ -7221,13 +7275,13 @@
         </p:nvSpPr>
         <p:spPr>
           <a:xfrm>
-            <a:off x="838200" y="1305243"/>
-            <a:ext cx="10515600" cy="4871720"/>
+            <a:off x="838200" y="1305242"/>
+            <a:ext cx="10515600" cy="5145891"/>
           </a:xfrm>
         </p:spPr>
         <p:txBody>
           <a:bodyPr>
-            <a:normAutofit/>
+            <a:normAutofit fontScale="92500" lnSpcReduction="10000"/>
           </a:bodyPr>
           <a:lstStyle/>
           <a:p>
@@ -7235,11 +7289,23 @@
               <a:buNone/>
             </a:pPr>
             <a:r>
-              <a:rPr lang="pt-BR" dirty="0">
-                <a:latin typeface="Times New Roman" panose="02020603050405020304" pitchFamily="18" charset="0"/>
-                <a:cs typeface="Times New Roman" panose="02020603050405020304" pitchFamily="18" charset="0"/>
-              </a:rPr>
-              <a:t>Em virtude da crise política e econômica vivenciada no Brasil nos anos de 2017 e 2018, o desemprego cresceu, mais precisamente 3,6% considerando o desemprego em janeiro de 2017 e o mesmo período no ano anterior (GLOBO, 2017).</a:t>
+              <a:rPr lang="pt-BR" dirty="0"/>
+              <a:t>É factual o crescimento de diplomados no Brasil, todavia esse número ainda é pouco expressivo, considerando 7,9% da população brasileira, trata-se de menos de 13,4 milhões de diplomados (IBGE, 2012). É notório o espaço para desenvolvimento acadêmico da população brasileira. </a:t>
+            </a:r>
+          </a:p>
+          <a:p>
+            <a:pPr marL="0" indent="0">
+              <a:buNone/>
+            </a:pPr>
+            <a:endParaRPr lang="pt-BR" dirty="0"/>
+          </a:p>
+          <a:p>
+            <a:pPr marL="0" indent="0">
+              <a:buNone/>
+            </a:pPr>
+            <a:r>
+              <a:rPr lang="pt-BR" dirty="0"/>
+              <a:t>Além do ENEM, diversas universidades, faculdades e até mesmo cursinhos, disponibilizam todos os anos provas de seus vestibulares, com o objetivo de incentivar a prática de estudantes e interessados. </a:t>
             </a:r>
           </a:p>
           <a:p>
@@ -7256,11 +7322,8 @@
               <a:buNone/>
             </a:pPr>
             <a:r>
-              <a:rPr lang="pt-BR" dirty="0">
-                <a:latin typeface="Times New Roman" panose="02020603050405020304" pitchFamily="18" charset="0"/>
-                <a:cs typeface="Times New Roman" panose="02020603050405020304" pitchFamily="18" charset="0"/>
-              </a:rPr>
-              <a:t>O acirramento da competição no mercado de trabalho, leva milhões de pessoas a buscar atualizações, principalmente no âmbito de cursos superiores e pós-graduações. Existe um abismo claro entre o desejo de ingressar em uma instituição de ensino superior e a obtenção dos conhecimentos necessários para tal. </a:t>
+              <a:rPr lang="pt-BR" dirty="0"/>
+              <a:t>Ao longo do desenvolvimento deste trabalho, serão aplicadas tecnologias para transformar os arquivos, textos, imagens e gabaritos disponibilizados por vestibulares em uma maneira mais acessível e convidativa. Visando tornar o estudo de vestibulandos mais eficiente e produtivo.</a:t>
             </a:r>
           </a:p>
         </p:txBody>
@@ -7367,7 +7430,7 @@
                 <a:latin typeface="Times New Roman" panose="02020603050405020304" pitchFamily="18" charset="0"/>
                 <a:cs typeface="Times New Roman" panose="02020603050405020304" pitchFamily="18" charset="0"/>
               </a:rPr>
-              <a:t> Não existir um banco de questões de vestibulares de acesso público e facilitado, agilizando o estudo de vestibulandos. Atualmente as questões estão disponíveis através de arquivos PDF, dificultando a leitura e estudo de vestibulandos.</a:t>
+              <a:t> O esforço necessário para alunos e vestibulandos para simular a vivência e prática de vestibulares não é uma experiência agradável e nem convidativa, não existir um banco de questões de vestibulares de acesso público e facilitado acaba por atrasar os estudos, tornando o estudo menos eficiente. </a:t>
             </a:r>
           </a:p>
           <a:p>
@@ -7395,7 +7458,7 @@
                 <a:latin typeface="Times New Roman" panose="02020603050405020304" pitchFamily="18" charset="0"/>
                 <a:cs typeface="Times New Roman" panose="02020603050405020304" pitchFamily="18" charset="0"/>
               </a:rPr>
-              <a:t> Aplicação de tecnologias com o objetivo de alimentar um banco de dados, apenas por questões, repostas e textos provenientes de vestibulares, aliado a um aplicativo para dispositivos móveis que permita que vestibulandos revejam questões de vestibulares passados.</a:t>
+              <a:t> Estudo e aplicação de tecnologias com o objetivo de alimentar um banco de dados, apenas por questões, repostas e textos provenientes de vestibulares, de maneira a permitir outras formas de acesso e tornar os estudos mais eficientes para alunos e vestibulandos.</a:t>
             </a:r>
           </a:p>
           <a:p>
@@ -7417,6 +7480,92 @@
 </file>
 
 <file path=ppt/slides/slide6.xml><?xml version="1.0" encoding="utf-8"?>
+<p:sld xmlns:a="http://schemas.openxmlformats.org/drawingml/2006/main" xmlns:r="http://schemas.openxmlformats.org/officeDocument/2006/relationships" xmlns:p="http://schemas.openxmlformats.org/presentationml/2006/main">
+  <p:cSld>
+    <p:spTree>
+      <p:nvGrpSpPr>
+        <p:cNvPr id="1" name=""/>
+        <p:cNvGrpSpPr/>
+        <p:nvPr/>
+      </p:nvGrpSpPr>
+      <p:grpSpPr>
+        <a:xfrm>
+          <a:off x="0" y="0"/>
+          <a:ext cx="0" cy="0"/>
+          <a:chOff x="0" y="0"/>
+          <a:chExt cx="0" cy="0"/>
+        </a:xfrm>
+      </p:grpSpPr>
+      <p:sp>
+        <p:nvSpPr>
+          <p:cNvPr id="4" name="Título 3">
+            <a:extLst>
+              <a:ext uri="{FF2B5EF4-FFF2-40B4-BE49-F238E27FC236}">
+                <a16:creationId xmlns:a16="http://schemas.microsoft.com/office/drawing/2014/main" id="{B39360D0-960F-4A77-A656-7F85A9D05DB4}"/>
+              </a:ext>
+            </a:extLst>
+          </p:cNvPr>
+          <p:cNvSpPr>
+            <a:spLocks noGrp="1"/>
+          </p:cNvSpPr>
+          <p:nvPr>
+            <p:ph type="title"/>
+          </p:nvPr>
+        </p:nvSpPr>
+        <p:spPr/>
+        <p:txBody>
+          <a:bodyPr/>
+          <a:lstStyle/>
+          <a:p>
+            <a:r>
+              <a:rPr lang="pt-BR" dirty="0">
+                <a:latin typeface="Times New Roman" panose="02020603050405020304" pitchFamily="18" charset="0"/>
+                <a:cs typeface="Times New Roman" panose="02020603050405020304" pitchFamily="18" charset="0"/>
+              </a:rPr>
+              <a:t>Fundamentação Teórica</a:t>
+            </a:r>
+          </a:p>
+        </p:txBody>
+      </p:sp>
+      <p:sp>
+        <p:nvSpPr>
+          <p:cNvPr id="5" name="Espaço Reservado para Texto 4">
+            <a:extLst>
+              <a:ext uri="{FF2B5EF4-FFF2-40B4-BE49-F238E27FC236}">
+                <a16:creationId xmlns:a16="http://schemas.microsoft.com/office/drawing/2014/main" id="{8B2BB676-5301-4870-94BF-701B63BCAB51}"/>
+              </a:ext>
+            </a:extLst>
+          </p:cNvPr>
+          <p:cNvSpPr>
+            <a:spLocks noGrp="1"/>
+          </p:cNvSpPr>
+          <p:nvPr>
+            <p:ph type="body" idx="1"/>
+          </p:nvPr>
+        </p:nvSpPr>
+        <p:spPr/>
+        <p:txBody>
+          <a:bodyPr/>
+          <a:lstStyle/>
+          <a:p>
+            <a:endParaRPr lang="pt-BR" dirty="0"/>
+          </a:p>
+        </p:txBody>
+      </p:sp>
+    </p:spTree>
+    <p:extLst>
+      <p:ext uri="{BB962C8B-B14F-4D97-AF65-F5344CB8AC3E}">
+        <p14:creationId xmlns:p14="http://schemas.microsoft.com/office/powerpoint/2010/main" val="695889315"/>
+      </p:ext>
+    </p:extLst>
+  </p:cSld>
+  <p:clrMapOvr>
+    <a:masterClrMapping/>
+  </p:clrMapOvr>
+</p:sld>
+</file>
+
+<file path=ppt/slides/slide7.xml><?xml version="1.0" encoding="utf-8"?>
 <p:sld xmlns:a="http://schemas.openxmlformats.org/drawingml/2006/main" xmlns:r="http://schemas.openxmlformats.org/officeDocument/2006/relationships" xmlns:p="http://schemas.openxmlformats.org/presentationml/2006/main">
   <p:cSld>
     <p:bg>
@@ -7580,92 +7729,6 @@
     <p:extLst>
       <p:ext uri="{BB962C8B-B14F-4D97-AF65-F5344CB8AC3E}">
         <p14:creationId xmlns:p14="http://schemas.microsoft.com/office/powerpoint/2010/main" val="1606848409"/>
-      </p:ext>
-    </p:extLst>
-  </p:cSld>
-  <p:clrMapOvr>
-    <a:masterClrMapping/>
-  </p:clrMapOvr>
-</p:sld>
-</file>
-
-<file path=ppt/slides/slide7.xml><?xml version="1.0" encoding="utf-8"?>
-<p:sld xmlns:a="http://schemas.openxmlformats.org/drawingml/2006/main" xmlns:r="http://schemas.openxmlformats.org/officeDocument/2006/relationships" xmlns:p="http://schemas.openxmlformats.org/presentationml/2006/main">
-  <p:cSld>
-    <p:spTree>
-      <p:nvGrpSpPr>
-        <p:cNvPr id="1" name=""/>
-        <p:cNvGrpSpPr/>
-        <p:nvPr/>
-      </p:nvGrpSpPr>
-      <p:grpSpPr>
-        <a:xfrm>
-          <a:off x="0" y="0"/>
-          <a:ext cx="0" cy="0"/>
-          <a:chOff x="0" y="0"/>
-          <a:chExt cx="0" cy="0"/>
-        </a:xfrm>
-      </p:grpSpPr>
-      <p:sp>
-        <p:nvSpPr>
-          <p:cNvPr id="4" name="Título 3">
-            <a:extLst>
-              <a:ext uri="{FF2B5EF4-FFF2-40B4-BE49-F238E27FC236}">
-                <a16:creationId xmlns:a16="http://schemas.microsoft.com/office/drawing/2014/main" id="{B39360D0-960F-4A77-A656-7F85A9D05DB4}"/>
-              </a:ext>
-            </a:extLst>
-          </p:cNvPr>
-          <p:cNvSpPr>
-            <a:spLocks noGrp="1"/>
-          </p:cNvSpPr>
-          <p:nvPr>
-            <p:ph type="title"/>
-          </p:nvPr>
-        </p:nvSpPr>
-        <p:spPr/>
-        <p:txBody>
-          <a:bodyPr/>
-          <a:lstStyle/>
-          <a:p>
-            <a:r>
-              <a:rPr lang="pt-BR" dirty="0">
-                <a:latin typeface="Times New Roman" panose="02020603050405020304" pitchFamily="18" charset="0"/>
-                <a:cs typeface="Times New Roman" panose="02020603050405020304" pitchFamily="18" charset="0"/>
-              </a:rPr>
-              <a:t>Fundamentação Teórica</a:t>
-            </a:r>
-          </a:p>
-        </p:txBody>
-      </p:sp>
-      <p:sp>
-        <p:nvSpPr>
-          <p:cNvPr id="5" name="Espaço Reservado para Texto 4">
-            <a:extLst>
-              <a:ext uri="{FF2B5EF4-FFF2-40B4-BE49-F238E27FC236}">
-                <a16:creationId xmlns:a16="http://schemas.microsoft.com/office/drawing/2014/main" id="{8B2BB676-5301-4870-94BF-701B63BCAB51}"/>
-              </a:ext>
-            </a:extLst>
-          </p:cNvPr>
-          <p:cNvSpPr>
-            <a:spLocks noGrp="1"/>
-          </p:cNvSpPr>
-          <p:nvPr>
-            <p:ph type="body" idx="1"/>
-          </p:nvPr>
-        </p:nvSpPr>
-        <p:spPr/>
-        <p:txBody>
-          <a:bodyPr/>
-          <a:lstStyle/>
-          <a:p>
-            <a:endParaRPr lang="pt-BR" dirty="0"/>
-          </a:p>
-        </p:txBody>
-      </p:sp>
-    </p:spTree>
-    <p:extLst>
-      <p:ext uri="{BB962C8B-B14F-4D97-AF65-F5344CB8AC3E}">
-        <p14:creationId xmlns:p14="http://schemas.microsoft.com/office/powerpoint/2010/main" val="695889315"/>
       </p:ext>
     </p:extLst>
   </p:cSld>

</xml_diff>